<commit_message>
set up one command to count all the miles and make the graph including weight and line fit
</commit_message>
<xml_diff>
--- a/diet.pptx
+++ b/diet.pptx
@@ -1407,7 +1407,7 @@
         <p:spPr>
           <a:xfrm>
             <a:off x="1388520" y="792000"/>
-            <a:ext cx="160920" cy="1479240"/>
+            <a:ext cx="159840" cy="1478160"/>
           </a:xfrm>
           <a:prstGeom prst="rect">
             <a:avLst/>
@@ -1437,7 +1437,7 @@
         <p:spPr>
           <a:xfrm>
             <a:off x="1717560" y="792000"/>
-            <a:ext cx="161640" cy="1479240"/>
+            <a:ext cx="160560" cy="1478160"/>
           </a:xfrm>
           <a:prstGeom prst="rect">
             <a:avLst/>
@@ -1467,7 +1467,7 @@
         <p:spPr>
           <a:xfrm>
             <a:off x="2047320" y="792000"/>
-            <a:ext cx="160920" cy="1479240"/>
+            <a:ext cx="159840" cy="1478160"/>
           </a:xfrm>
           <a:prstGeom prst="rect">
             <a:avLst/>
@@ -1497,7 +1497,7 @@
         <p:spPr>
           <a:xfrm>
             <a:off x="2376360" y="792000"/>
-            <a:ext cx="161640" cy="1479240"/>
+            <a:ext cx="160560" cy="1478160"/>
           </a:xfrm>
           <a:prstGeom prst="rect">
             <a:avLst/>
@@ -1526,8 +1526,8 @@
         </p:nvSpPr>
         <p:spPr>
           <a:xfrm rot="3468000">
-            <a:off x="1869480" y="759240"/>
-            <a:ext cx="161280" cy="1479240"/>
+            <a:off x="1869480" y="758520"/>
+            <a:ext cx="160200" cy="1478160"/>
           </a:xfrm>
           <a:prstGeom prst="rect">
             <a:avLst/>
@@ -1557,7 +1557,7 @@
         <p:spPr>
           <a:xfrm>
             <a:off x="3472200" y="792000"/>
-            <a:ext cx="160920" cy="1479240"/>
+            <a:ext cx="159840" cy="1478160"/>
           </a:xfrm>
           <a:prstGeom prst="rect">
             <a:avLst/>
@@ -1587,7 +1587,7 @@
         <p:spPr>
           <a:xfrm>
             <a:off x="3801240" y="792000"/>
-            <a:ext cx="161640" cy="1479240"/>
+            <a:ext cx="160560" cy="1478160"/>
           </a:xfrm>
           <a:prstGeom prst="rect">
             <a:avLst/>
@@ -1617,7 +1617,7 @@
         <p:spPr>
           <a:xfrm>
             <a:off x="4131000" y="792000"/>
-            <a:ext cx="160920" cy="1479240"/>
+            <a:ext cx="159840" cy="1478160"/>
           </a:xfrm>
           <a:prstGeom prst="rect">
             <a:avLst/>
@@ -1647,7 +1647,7 @@
         <p:spPr>
           <a:xfrm>
             <a:off x="4460040" y="792000"/>
-            <a:ext cx="161640" cy="1479240"/>
+            <a:ext cx="160560" cy="1478160"/>
           </a:xfrm>
           <a:prstGeom prst="rect">
             <a:avLst/>
@@ -1676,8 +1676,8 @@
         </p:nvSpPr>
         <p:spPr>
           <a:xfrm rot="3468000">
-            <a:off x="3953160" y="759240"/>
-            <a:ext cx="161280" cy="1479240"/>
+            <a:off x="3953160" y="758520"/>
+            <a:ext cx="160200" cy="1478160"/>
           </a:xfrm>
           <a:prstGeom prst="rect">
             <a:avLst/>
@@ -1707,7 +1707,7 @@
         <p:spPr>
           <a:xfrm>
             <a:off x="1388520" y="792000"/>
-            <a:ext cx="160920" cy="1479240"/>
+            <a:ext cx="159840" cy="1478160"/>
           </a:xfrm>
           <a:prstGeom prst="rect">
             <a:avLst/>
@@ -1737,7 +1737,7 @@
         <p:spPr>
           <a:xfrm>
             <a:off x="1717560" y="792000"/>
-            <a:ext cx="161640" cy="1479240"/>
+            <a:ext cx="160560" cy="1478160"/>
           </a:xfrm>
           <a:prstGeom prst="rect">
             <a:avLst/>
@@ -1767,7 +1767,7 @@
         <p:spPr>
           <a:xfrm>
             <a:off x="2047320" y="792000"/>
-            <a:ext cx="160920" cy="1479240"/>
+            <a:ext cx="159840" cy="1478160"/>
           </a:xfrm>
           <a:prstGeom prst="rect">
             <a:avLst/>
@@ -1797,7 +1797,7 @@
         <p:spPr>
           <a:xfrm>
             <a:off x="2376360" y="792000"/>
-            <a:ext cx="161640" cy="1479240"/>
+            <a:ext cx="160560" cy="1478160"/>
           </a:xfrm>
           <a:prstGeom prst="rect">
             <a:avLst/>
@@ -1826,8 +1826,8 @@
         </p:nvSpPr>
         <p:spPr>
           <a:xfrm rot="3468000">
-            <a:off x="1869480" y="759240"/>
-            <a:ext cx="161280" cy="1479240"/>
+            <a:off x="1869480" y="758520"/>
+            <a:ext cx="160200" cy="1478160"/>
           </a:xfrm>
           <a:prstGeom prst="rect">
             <a:avLst/>
@@ -1857,7 +1857,7 @@
         <p:spPr>
           <a:xfrm>
             <a:off x="3472200" y="792000"/>
-            <a:ext cx="160920" cy="1479240"/>
+            <a:ext cx="159840" cy="1478160"/>
           </a:xfrm>
           <a:prstGeom prst="rect">
             <a:avLst/>
@@ -1887,7 +1887,7 @@
         <p:spPr>
           <a:xfrm>
             <a:off x="3801240" y="792000"/>
-            <a:ext cx="161640" cy="1479240"/>
+            <a:ext cx="160560" cy="1478160"/>
           </a:xfrm>
           <a:prstGeom prst="rect">
             <a:avLst/>
@@ -1917,7 +1917,7 @@
         <p:spPr>
           <a:xfrm>
             <a:off x="4131000" y="792000"/>
-            <a:ext cx="160920" cy="1479240"/>
+            <a:ext cx="159840" cy="1478160"/>
           </a:xfrm>
           <a:prstGeom prst="rect">
             <a:avLst/>
@@ -1947,7 +1947,7 @@
         <p:spPr>
           <a:xfrm>
             <a:off x="4460040" y="792000"/>
-            <a:ext cx="161640" cy="1479240"/>
+            <a:ext cx="160560" cy="1478160"/>
           </a:xfrm>
           <a:prstGeom prst="rect">
             <a:avLst/>
@@ -1976,8 +1976,8 @@
         </p:nvSpPr>
         <p:spPr>
           <a:xfrm rot="3468000">
-            <a:off x="3953160" y="759240"/>
-            <a:ext cx="161280" cy="1479240"/>
+            <a:off x="3953160" y="758520"/>
+            <a:ext cx="160200" cy="1478160"/>
           </a:xfrm>
           <a:prstGeom prst="rect">
             <a:avLst/>
@@ -2007,7 +2007,7 @@
         <p:spPr>
           <a:xfrm>
             <a:off x="5613120" y="792000"/>
-            <a:ext cx="161280" cy="1479240"/>
+            <a:ext cx="160200" cy="1478160"/>
           </a:xfrm>
           <a:prstGeom prst="rect">
             <a:avLst/>
@@ -2037,7 +2037,7 @@
         <p:spPr>
           <a:xfrm>
             <a:off x="5942520" y="792000"/>
-            <a:ext cx="161640" cy="1479240"/>
+            <a:ext cx="160560" cy="1478160"/>
           </a:xfrm>
           <a:prstGeom prst="rect">
             <a:avLst/>
@@ -2067,7 +2067,7 @@
         <p:spPr>
           <a:xfrm>
             <a:off x="6271920" y="792000"/>
-            <a:ext cx="161280" cy="1479240"/>
+            <a:ext cx="160200" cy="1478160"/>
           </a:xfrm>
           <a:prstGeom prst="rect">
             <a:avLst/>
@@ -2097,7 +2097,7 @@
         <p:spPr>
           <a:xfrm>
             <a:off x="6601320" y="792000"/>
-            <a:ext cx="161640" cy="1479240"/>
+            <a:ext cx="160560" cy="1478160"/>
           </a:xfrm>
           <a:prstGeom prst="rect">
             <a:avLst/>
@@ -2126,8 +2126,8 @@
         </p:nvSpPr>
         <p:spPr>
           <a:xfrm rot="3468000">
-            <a:off x="6094440" y="759240"/>
-            <a:ext cx="161280" cy="1479240"/>
+            <a:off x="6094440" y="758520"/>
+            <a:ext cx="160200" cy="1478160"/>
           </a:xfrm>
           <a:prstGeom prst="rect">
             <a:avLst/>
@@ -2157,7 +2157,7 @@
         <p:spPr>
           <a:xfrm>
             <a:off x="7696800" y="792000"/>
-            <a:ext cx="161280" cy="1479240"/>
+            <a:ext cx="160200" cy="1478160"/>
           </a:xfrm>
           <a:prstGeom prst="rect">
             <a:avLst/>
@@ -2187,7 +2187,7 @@
         <p:spPr>
           <a:xfrm>
             <a:off x="8026200" y="792000"/>
-            <a:ext cx="161640" cy="1479240"/>
+            <a:ext cx="160560" cy="1478160"/>
           </a:xfrm>
           <a:prstGeom prst="rect">
             <a:avLst/>
@@ -2217,7 +2217,7 @@
         <p:spPr>
           <a:xfrm>
             <a:off x="8355600" y="792000"/>
-            <a:ext cx="161280" cy="1479240"/>
+            <a:ext cx="160200" cy="1478160"/>
           </a:xfrm>
           <a:prstGeom prst="rect">
             <a:avLst/>
@@ -2247,7 +2247,7 @@
         <p:spPr>
           <a:xfrm>
             <a:off x="8685000" y="792000"/>
-            <a:ext cx="161640" cy="1479240"/>
+            <a:ext cx="160560" cy="1478160"/>
           </a:xfrm>
           <a:prstGeom prst="rect">
             <a:avLst/>
@@ -2276,8 +2276,8 @@
         </p:nvSpPr>
         <p:spPr>
           <a:xfrm rot="3468000">
-            <a:off x="8178120" y="759240"/>
-            <a:ext cx="161280" cy="1479240"/>
+            <a:off x="8178120" y="758520"/>
+            <a:ext cx="160200" cy="1478160"/>
           </a:xfrm>
           <a:prstGeom prst="rect">
             <a:avLst/>
@@ -2307,7 +2307,7 @@
         <p:spPr>
           <a:xfrm>
             <a:off x="5613120" y="792000"/>
-            <a:ext cx="161280" cy="1479240"/>
+            <a:ext cx="160200" cy="1478160"/>
           </a:xfrm>
           <a:prstGeom prst="rect">
             <a:avLst/>
@@ -2337,7 +2337,7 @@
         <p:spPr>
           <a:xfrm>
             <a:off x="5942520" y="792000"/>
-            <a:ext cx="161640" cy="1479240"/>
+            <a:ext cx="160560" cy="1478160"/>
           </a:xfrm>
           <a:prstGeom prst="rect">
             <a:avLst/>
@@ -2367,7 +2367,7 @@
         <p:spPr>
           <a:xfrm>
             <a:off x="6271920" y="792000"/>
-            <a:ext cx="161280" cy="1479240"/>
+            <a:ext cx="160200" cy="1478160"/>
           </a:xfrm>
           <a:prstGeom prst="rect">
             <a:avLst/>
@@ -2397,7 +2397,7 @@
         <p:spPr>
           <a:xfrm>
             <a:off x="6601320" y="792000"/>
-            <a:ext cx="161640" cy="1479240"/>
+            <a:ext cx="160560" cy="1478160"/>
           </a:xfrm>
           <a:prstGeom prst="rect">
             <a:avLst/>
@@ -2426,8 +2426,8 @@
         </p:nvSpPr>
         <p:spPr>
           <a:xfrm rot="3468000">
-            <a:off x="6094440" y="759240"/>
-            <a:ext cx="161280" cy="1479240"/>
+            <a:off x="6094440" y="758520"/>
+            <a:ext cx="160200" cy="1478160"/>
           </a:xfrm>
           <a:prstGeom prst="rect">
             <a:avLst/>
@@ -2457,7 +2457,7 @@
         <p:spPr>
           <a:xfrm>
             <a:off x="7696800" y="792000"/>
-            <a:ext cx="161280" cy="1479240"/>
+            <a:ext cx="160200" cy="1478160"/>
           </a:xfrm>
           <a:prstGeom prst="rect">
             <a:avLst/>
@@ -2487,13 +2487,13 @@
         <p:spPr>
           <a:xfrm>
             <a:off x="8026200" y="792000"/>
-            <a:ext cx="161640" cy="1479240"/>
-          </a:xfrm>
-          <a:prstGeom prst="rect">
-            <a:avLst/>
-          </a:prstGeom>
-          <a:solidFill>
-            <a:srgbClr val="ffffff"/>
+            <a:ext cx="160560" cy="1478160"/>
+          </a:xfrm>
+          <a:prstGeom prst="rect">
+            <a:avLst/>
+          </a:prstGeom>
+          <a:solidFill>
+            <a:srgbClr val="000000"/>
           </a:solidFill>
           <a:ln>
             <a:solidFill>
@@ -2517,13 +2517,13 @@
         <p:spPr>
           <a:xfrm>
             <a:off x="8355600" y="792000"/>
-            <a:ext cx="161280" cy="1479240"/>
-          </a:xfrm>
-          <a:prstGeom prst="rect">
-            <a:avLst/>
-          </a:prstGeom>
-          <a:solidFill>
-            <a:srgbClr val="ffffff"/>
+            <a:ext cx="160200" cy="1478160"/>
+          </a:xfrm>
+          <a:prstGeom prst="rect">
+            <a:avLst/>
+          </a:prstGeom>
+          <a:solidFill>
+            <a:srgbClr val="000000"/>
           </a:solidFill>
           <a:ln>
             <a:solidFill>
@@ -2547,13 +2547,13 @@
         <p:spPr>
           <a:xfrm>
             <a:off x="8685000" y="792000"/>
-            <a:ext cx="161640" cy="1479240"/>
-          </a:xfrm>
-          <a:prstGeom prst="rect">
-            <a:avLst/>
-          </a:prstGeom>
-          <a:solidFill>
-            <a:srgbClr val="ffffff"/>
+            <a:ext cx="160560" cy="1478160"/>
+          </a:xfrm>
+          <a:prstGeom prst="rect">
+            <a:avLst/>
+          </a:prstGeom>
+          <a:solidFill>
+            <a:srgbClr val="000000"/>
           </a:solidFill>
           <a:ln>
             <a:solidFill>
@@ -2576,14 +2576,14 @@
         </p:nvSpPr>
         <p:spPr>
           <a:xfrm rot="3468000">
-            <a:off x="8178120" y="759240"/>
-            <a:ext cx="161280" cy="1479240"/>
-          </a:xfrm>
-          <a:prstGeom prst="rect">
-            <a:avLst/>
-          </a:prstGeom>
-          <a:solidFill>
-            <a:srgbClr val="ffffff"/>
+            <a:off x="8178120" y="758520"/>
+            <a:ext cx="160200" cy="1478160"/>
+          </a:xfrm>
+          <a:prstGeom prst="rect">
+            <a:avLst/>
+          </a:prstGeom>
+          <a:solidFill>
+            <a:srgbClr val="000000"/>
           </a:solidFill>
           <a:ln>
             <a:solidFill>
@@ -2607,7 +2607,7 @@
         <p:spPr>
           <a:xfrm>
             <a:off x="1363320" y="2933280"/>
-            <a:ext cx="161640" cy="1479240"/>
+            <a:ext cx="160560" cy="1478160"/>
           </a:xfrm>
           <a:prstGeom prst="rect">
             <a:avLst/>
@@ -2637,7 +2637,7 @@
         <p:spPr>
           <a:xfrm>
             <a:off x="1693080" y="2933280"/>
-            <a:ext cx="161640" cy="1479240"/>
+            <a:ext cx="160560" cy="1478160"/>
           </a:xfrm>
           <a:prstGeom prst="rect">
             <a:avLst/>
@@ -2667,7 +2667,7 @@
         <p:spPr>
           <a:xfrm>
             <a:off x="2022480" y="2933280"/>
-            <a:ext cx="161280" cy="1479240"/>
+            <a:ext cx="160200" cy="1478160"/>
           </a:xfrm>
           <a:prstGeom prst="rect">
             <a:avLst/>
@@ -2697,7 +2697,7 @@
         <p:spPr>
           <a:xfrm>
             <a:off x="2351880" y="2933280"/>
-            <a:ext cx="161640" cy="1479240"/>
+            <a:ext cx="160560" cy="1478160"/>
           </a:xfrm>
           <a:prstGeom prst="rect">
             <a:avLst/>
@@ -2726,8 +2726,8 @@
         </p:nvSpPr>
         <p:spPr>
           <a:xfrm rot="3468000">
-            <a:off x="1845000" y="2900520"/>
-            <a:ext cx="161280" cy="1479240"/>
+            <a:off x="1845000" y="2899800"/>
+            <a:ext cx="160200" cy="1478160"/>
           </a:xfrm>
           <a:prstGeom prst="rect">
             <a:avLst/>
@@ -2757,7 +2757,7 @@
         <p:spPr>
           <a:xfrm>
             <a:off x="3447000" y="2933280"/>
-            <a:ext cx="161640" cy="1479240"/>
+            <a:ext cx="160560" cy="1478160"/>
           </a:xfrm>
           <a:prstGeom prst="rect">
             <a:avLst/>
@@ -2787,7 +2787,7 @@
         <p:spPr>
           <a:xfrm>
             <a:off x="3776760" y="2933280"/>
-            <a:ext cx="160920" cy="1479240"/>
+            <a:ext cx="159840" cy="1478160"/>
           </a:xfrm>
           <a:prstGeom prst="rect">
             <a:avLst/>
@@ -2817,7 +2817,7 @@
         <p:spPr>
           <a:xfrm>
             <a:off x="4105800" y="2933280"/>
-            <a:ext cx="161640" cy="1479240"/>
+            <a:ext cx="160560" cy="1478160"/>
           </a:xfrm>
           <a:prstGeom prst="rect">
             <a:avLst/>
@@ -2847,7 +2847,7 @@
         <p:spPr>
           <a:xfrm>
             <a:off x="4435560" y="2933280"/>
-            <a:ext cx="161640" cy="1479240"/>
+            <a:ext cx="160560" cy="1478160"/>
           </a:xfrm>
           <a:prstGeom prst="rect">
             <a:avLst/>
@@ -2876,8 +2876,8 @@
         </p:nvSpPr>
         <p:spPr>
           <a:xfrm rot="3468000">
-            <a:off x="3929400" y="2901960"/>
-            <a:ext cx="161280" cy="1478880"/>
+            <a:off x="3929400" y="2900880"/>
+            <a:ext cx="160200" cy="1477800"/>
           </a:xfrm>
           <a:prstGeom prst="rect">
             <a:avLst/>
@@ -2907,7 +2907,7 @@
         <p:spPr>
           <a:xfrm>
             <a:off x="1363320" y="2933280"/>
-            <a:ext cx="161640" cy="1479240"/>
+            <a:ext cx="160560" cy="1478160"/>
           </a:xfrm>
           <a:prstGeom prst="rect">
             <a:avLst/>
@@ -2937,7 +2937,7 @@
         <p:spPr>
           <a:xfrm>
             <a:off x="1693080" y="2933280"/>
-            <a:ext cx="161640" cy="1479240"/>
+            <a:ext cx="160560" cy="1478160"/>
           </a:xfrm>
           <a:prstGeom prst="rect">
             <a:avLst/>
@@ -2967,7 +2967,7 @@
         <p:spPr>
           <a:xfrm>
             <a:off x="2022480" y="2933280"/>
-            <a:ext cx="161280" cy="1479240"/>
+            <a:ext cx="160200" cy="1478160"/>
           </a:xfrm>
           <a:prstGeom prst="rect">
             <a:avLst/>
@@ -2997,7 +2997,7 @@
         <p:spPr>
           <a:xfrm>
             <a:off x="2351880" y="2933280"/>
-            <a:ext cx="161640" cy="1479240"/>
+            <a:ext cx="160560" cy="1478160"/>
           </a:xfrm>
           <a:prstGeom prst="rect">
             <a:avLst/>
@@ -3026,8 +3026,8 @@
         </p:nvSpPr>
         <p:spPr>
           <a:xfrm rot="3468000">
-            <a:off x="1845000" y="2900520"/>
-            <a:ext cx="161280" cy="1479240"/>
+            <a:off x="1845000" y="2899800"/>
+            <a:ext cx="160200" cy="1478160"/>
           </a:xfrm>
           <a:prstGeom prst="rect">
             <a:avLst/>
@@ -3057,7 +3057,7 @@
         <p:spPr>
           <a:xfrm>
             <a:off x="3447000" y="2933280"/>
-            <a:ext cx="161640" cy="1479240"/>
+            <a:ext cx="160560" cy="1478160"/>
           </a:xfrm>
           <a:prstGeom prst="rect">
             <a:avLst/>
@@ -3087,7 +3087,7 @@
         <p:spPr>
           <a:xfrm>
             <a:off x="3776760" y="2933280"/>
-            <a:ext cx="160920" cy="1479240"/>
+            <a:ext cx="159840" cy="1478160"/>
           </a:xfrm>
           <a:prstGeom prst="rect">
             <a:avLst/>
@@ -3117,7 +3117,7 @@
         <p:spPr>
           <a:xfrm>
             <a:off x="4105800" y="2933280"/>
-            <a:ext cx="161640" cy="1479240"/>
+            <a:ext cx="160560" cy="1478160"/>
           </a:xfrm>
           <a:prstGeom prst="rect">
             <a:avLst/>
@@ -3147,7 +3147,7 @@
         <p:spPr>
           <a:xfrm>
             <a:off x="4435560" y="2933280"/>
-            <a:ext cx="161640" cy="1479240"/>
+            <a:ext cx="160560" cy="1478160"/>
           </a:xfrm>
           <a:prstGeom prst="rect">
             <a:avLst/>
@@ -3176,8 +3176,8 @@
         </p:nvSpPr>
         <p:spPr>
           <a:xfrm rot="3468000">
-            <a:off x="3929400" y="2901960"/>
-            <a:ext cx="161280" cy="1478880"/>
+            <a:off x="3929400" y="2900880"/>
+            <a:ext cx="160200" cy="1477800"/>
           </a:xfrm>
           <a:prstGeom prst="rect">
             <a:avLst/>
@@ -3207,7 +3207,7 @@
         <p:spPr>
           <a:xfrm>
             <a:off x="5613120" y="2933280"/>
-            <a:ext cx="161280" cy="1479240"/>
+            <a:ext cx="160200" cy="1478160"/>
           </a:xfrm>
           <a:prstGeom prst="rect">
             <a:avLst/>
@@ -3237,7 +3237,7 @@
         <p:spPr>
           <a:xfrm>
             <a:off x="5942520" y="2933280"/>
-            <a:ext cx="161640" cy="1479240"/>
+            <a:ext cx="160560" cy="1478160"/>
           </a:xfrm>
           <a:prstGeom prst="rect">
             <a:avLst/>
@@ -3267,7 +3267,7 @@
         <p:spPr>
           <a:xfrm>
             <a:off x="6271920" y="2933280"/>
-            <a:ext cx="161280" cy="1479240"/>
+            <a:ext cx="160200" cy="1478160"/>
           </a:xfrm>
           <a:prstGeom prst="rect">
             <a:avLst/>
@@ -3297,7 +3297,7 @@
         <p:spPr>
           <a:xfrm>
             <a:off x="6601320" y="2933280"/>
-            <a:ext cx="161640" cy="1479240"/>
+            <a:ext cx="160560" cy="1478160"/>
           </a:xfrm>
           <a:prstGeom prst="rect">
             <a:avLst/>
@@ -3326,8 +3326,8 @@
         </p:nvSpPr>
         <p:spPr>
           <a:xfrm rot="3468000">
-            <a:off x="6094440" y="2900520"/>
-            <a:ext cx="161280" cy="1479240"/>
+            <a:off x="6094440" y="2899800"/>
+            <a:ext cx="160200" cy="1478160"/>
           </a:xfrm>
           <a:prstGeom prst="rect">
             <a:avLst/>
@@ -3357,7 +3357,7 @@
         <p:spPr>
           <a:xfrm>
             <a:off x="7696800" y="2933280"/>
-            <a:ext cx="161280" cy="1479240"/>
+            <a:ext cx="160200" cy="1478160"/>
           </a:xfrm>
           <a:prstGeom prst="rect">
             <a:avLst/>
@@ -3387,7 +3387,7 @@
         <p:spPr>
           <a:xfrm>
             <a:off x="8026200" y="2933280"/>
-            <a:ext cx="161640" cy="1479240"/>
+            <a:ext cx="160560" cy="1478160"/>
           </a:xfrm>
           <a:prstGeom prst="rect">
             <a:avLst/>
@@ -3417,7 +3417,7 @@
         <p:spPr>
           <a:xfrm>
             <a:off x="8355600" y="2933280"/>
-            <a:ext cx="161280" cy="1479240"/>
+            <a:ext cx="160200" cy="1478160"/>
           </a:xfrm>
           <a:prstGeom prst="rect">
             <a:avLst/>
@@ -3447,7 +3447,7 @@
         <p:spPr>
           <a:xfrm>
             <a:off x="8685000" y="2933280"/>
-            <a:ext cx="161640" cy="1479240"/>
+            <a:ext cx="160560" cy="1478160"/>
           </a:xfrm>
           <a:prstGeom prst="rect">
             <a:avLst/>
@@ -3476,8 +3476,8 @@
         </p:nvSpPr>
         <p:spPr>
           <a:xfrm rot="3468000">
-            <a:off x="8178120" y="2900520"/>
-            <a:ext cx="161280" cy="1479240"/>
+            <a:off x="8178120" y="2899800"/>
+            <a:ext cx="160200" cy="1478160"/>
           </a:xfrm>
           <a:prstGeom prst="rect">
             <a:avLst/>
@@ -3507,7 +3507,7 @@
         <p:spPr>
           <a:xfrm>
             <a:off x="5613120" y="2933280"/>
-            <a:ext cx="161280" cy="1479240"/>
+            <a:ext cx="160200" cy="1478160"/>
           </a:xfrm>
           <a:prstGeom prst="rect">
             <a:avLst/>
@@ -3537,7 +3537,7 @@
         <p:spPr>
           <a:xfrm>
             <a:off x="5942520" y="2933280"/>
-            <a:ext cx="161640" cy="1479240"/>
+            <a:ext cx="160560" cy="1478160"/>
           </a:xfrm>
           <a:prstGeom prst="rect">
             <a:avLst/>
@@ -3567,7 +3567,7 @@
         <p:spPr>
           <a:xfrm>
             <a:off x="6271920" y="2933280"/>
-            <a:ext cx="161280" cy="1479240"/>
+            <a:ext cx="160200" cy="1478160"/>
           </a:xfrm>
           <a:prstGeom prst="rect">
             <a:avLst/>
@@ -3597,7 +3597,7 @@
         <p:spPr>
           <a:xfrm>
             <a:off x="6601320" y="2933280"/>
-            <a:ext cx="161640" cy="1479240"/>
+            <a:ext cx="160560" cy="1478160"/>
           </a:xfrm>
           <a:prstGeom prst="rect">
             <a:avLst/>
@@ -3626,8 +3626,8 @@
         </p:nvSpPr>
         <p:spPr>
           <a:xfrm rot="3468000">
-            <a:off x="6094440" y="2900520"/>
-            <a:ext cx="161280" cy="1479240"/>
+            <a:off x="6094440" y="2899800"/>
+            <a:ext cx="160200" cy="1478160"/>
           </a:xfrm>
           <a:prstGeom prst="rect">
             <a:avLst/>
@@ -3657,7 +3657,7 @@
         <p:spPr>
           <a:xfrm>
             <a:off x="7696800" y="2933280"/>
-            <a:ext cx="161280" cy="1479240"/>
+            <a:ext cx="160200" cy="1478160"/>
           </a:xfrm>
           <a:prstGeom prst="rect">
             <a:avLst/>
@@ -3687,7 +3687,7 @@
         <p:spPr>
           <a:xfrm>
             <a:off x="8026200" y="2933280"/>
-            <a:ext cx="161640" cy="1479240"/>
+            <a:ext cx="160560" cy="1478160"/>
           </a:xfrm>
           <a:prstGeom prst="rect">
             <a:avLst/>
@@ -3717,7 +3717,7 @@
         <p:spPr>
           <a:xfrm>
             <a:off x="8355600" y="2933280"/>
-            <a:ext cx="161280" cy="1479240"/>
+            <a:ext cx="160200" cy="1478160"/>
           </a:xfrm>
           <a:prstGeom prst="rect">
             <a:avLst/>
@@ -3747,7 +3747,7 @@
         <p:spPr>
           <a:xfrm>
             <a:off x="8685000" y="2933280"/>
-            <a:ext cx="161640" cy="1479240"/>
+            <a:ext cx="160560" cy="1478160"/>
           </a:xfrm>
           <a:prstGeom prst="rect">
             <a:avLst/>
@@ -3776,8 +3776,8 @@
         </p:nvSpPr>
         <p:spPr>
           <a:xfrm rot="3468000">
-            <a:off x="8178120" y="2900520"/>
-            <a:ext cx="161280" cy="1479240"/>
+            <a:off x="8178120" y="2899800"/>
+            <a:ext cx="160200" cy="1478160"/>
           </a:xfrm>
           <a:prstGeom prst="rect">
             <a:avLst/>
@@ -3807,7 +3807,7 @@
         <p:spPr>
           <a:xfrm>
             <a:off x="1330920" y="5239440"/>
-            <a:ext cx="160920" cy="1479240"/>
+            <a:ext cx="159840" cy="1478160"/>
           </a:xfrm>
           <a:prstGeom prst="rect">
             <a:avLst/>
@@ -3837,7 +3837,7 @@
         <p:spPr>
           <a:xfrm>
             <a:off x="1659960" y="5239440"/>
-            <a:ext cx="161640" cy="1479240"/>
+            <a:ext cx="160560" cy="1478160"/>
           </a:xfrm>
           <a:prstGeom prst="rect">
             <a:avLst/>
@@ -3867,7 +3867,7 @@
         <p:spPr>
           <a:xfrm>
             <a:off x="1989720" y="5239440"/>
-            <a:ext cx="161280" cy="1479240"/>
+            <a:ext cx="160200" cy="1478160"/>
           </a:xfrm>
           <a:prstGeom prst="rect">
             <a:avLst/>
@@ -3897,7 +3897,7 @@
         <p:spPr>
           <a:xfrm>
             <a:off x="2318760" y="5239440"/>
-            <a:ext cx="161640" cy="1479240"/>
+            <a:ext cx="160560" cy="1478160"/>
           </a:xfrm>
           <a:prstGeom prst="rect">
             <a:avLst/>
@@ -3926,8 +3926,8 @@
         </p:nvSpPr>
         <p:spPr>
           <a:xfrm rot="3468000">
-            <a:off x="1811160" y="5205600"/>
-            <a:ext cx="161280" cy="1479240"/>
+            <a:off x="1811160" y="5204880"/>
+            <a:ext cx="160200" cy="1478160"/>
           </a:xfrm>
           <a:prstGeom prst="rect">
             <a:avLst/>
@@ -3957,7 +3957,7 @@
         <p:spPr>
           <a:xfrm>
             <a:off x="3413880" y="5239440"/>
-            <a:ext cx="161640" cy="1479240"/>
+            <a:ext cx="160560" cy="1478160"/>
           </a:xfrm>
           <a:prstGeom prst="rect">
             <a:avLst/>
@@ -3987,7 +3987,7 @@
         <p:spPr>
           <a:xfrm>
             <a:off x="3743640" y="5239440"/>
-            <a:ext cx="161280" cy="1479240"/>
+            <a:ext cx="160200" cy="1478160"/>
           </a:xfrm>
           <a:prstGeom prst="rect">
             <a:avLst/>
@@ -4017,7 +4017,7 @@
         <p:spPr>
           <a:xfrm>
             <a:off x="4073400" y="5239440"/>
-            <a:ext cx="160920" cy="1479240"/>
+            <a:ext cx="159840" cy="1478160"/>
           </a:xfrm>
           <a:prstGeom prst="rect">
             <a:avLst/>
@@ -4047,7 +4047,7 @@
         <p:spPr>
           <a:xfrm>
             <a:off x="4402440" y="5239440"/>
-            <a:ext cx="161640" cy="1479240"/>
+            <a:ext cx="160560" cy="1478160"/>
           </a:xfrm>
           <a:prstGeom prst="rect">
             <a:avLst/>
@@ -4076,8 +4076,8 @@
         </p:nvSpPr>
         <p:spPr>
           <a:xfrm rot="3468000">
-            <a:off x="3894840" y="5205600"/>
-            <a:ext cx="161280" cy="1479240"/>
+            <a:off x="3894840" y="5204880"/>
+            <a:ext cx="160200" cy="1478160"/>
           </a:xfrm>
           <a:prstGeom prst="rect">
             <a:avLst/>
@@ -4107,7 +4107,7 @@
         <p:spPr>
           <a:xfrm>
             <a:off x="1330920" y="5239440"/>
-            <a:ext cx="160920" cy="1479240"/>
+            <a:ext cx="159840" cy="1478160"/>
           </a:xfrm>
           <a:prstGeom prst="rect">
             <a:avLst/>
@@ -4137,7 +4137,7 @@
         <p:spPr>
           <a:xfrm>
             <a:off x="1659960" y="5239440"/>
-            <a:ext cx="161640" cy="1479240"/>
+            <a:ext cx="160560" cy="1478160"/>
           </a:xfrm>
           <a:prstGeom prst="rect">
             <a:avLst/>
@@ -4167,7 +4167,7 @@
         <p:spPr>
           <a:xfrm>
             <a:off x="1989720" y="5239440"/>
-            <a:ext cx="161280" cy="1479240"/>
+            <a:ext cx="160200" cy="1478160"/>
           </a:xfrm>
           <a:prstGeom prst="rect">
             <a:avLst/>
@@ -4197,7 +4197,7 @@
         <p:spPr>
           <a:xfrm>
             <a:off x="2318760" y="5239440"/>
-            <a:ext cx="161640" cy="1479240"/>
+            <a:ext cx="160560" cy="1478160"/>
           </a:xfrm>
           <a:prstGeom prst="rect">
             <a:avLst/>
@@ -4226,8 +4226,8 @@
         </p:nvSpPr>
         <p:spPr>
           <a:xfrm rot="3468000">
-            <a:off x="1811160" y="5205600"/>
-            <a:ext cx="161280" cy="1479240"/>
+            <a:off x="1811160" y="5204880"/>
+            <a:ext cx="160200" cy="1478160"/>
           </a:xfrm>
           <a:prstGeom prst="rect">
             <a:avLst/>
@@ -4257,7 +4257,7 @@
         <p:spPr>
           <a:xfrm>
             <a:off x="3413880" y="5239440"/>
-            <a:ext cx="161640" cy="1479240"/>
+            <a:ext cx="160560" cy="1478160"/>
           </a:xfrm>
           <a:prstGeom prst="rect">
             <a:avLst/>
@@ -4287,7 +4287,7 @@
         <p:spPr>
           <a:xfrm>
             <a:off x="3743640" y="5239440"/>
-            <a:ext cx="161280" cy="1479240"/>
+            <a:ext cx="160200" cy="1478160"/>
           </a:xfrm>
           <a:prstGeom prst="rect">
             <a:avLst/>
@@ -4317,7 +4317,7 @@
         <p:spPr>
           <a:xfrm>
             <a:off x="4073400" y="5239440"/>
-            <a:ext cx="160920" cy="1479240"/>
+            <a:ext cx="159840" cy="1478160"/>
           </a:xfrm>
           <a:prstGeom prst="rect">
             <a:avLst/>
@@ -4347,7 +4347,7 @@
         <p:spPr>
           <a:xfrm>
             <a:off x="4402440" y="5239440"/>
-            <a:ext cx="161640" cy="1479240"/>
+            <a:ext cx="160560" cy="1478160"/>
           </a:xfrm>
           <a:prstGeom prst="rect">
             <a:avLst/>
@@ -4376,8 +4376,8 @@
         </p:nvSpPr>
         <p:spPr>
           <a:xfrm rot="3468000">
-            <a:off x="3894840" y="5205600"/>
-            <a:ext cx="161280" cy="1479240"/>
+            <a:off x="3894840" y="5204880"/>
+            <a:ext cx="160200" cy="1478160"/>
           </a:xfrm>
           <a:prstGeom prst="rect">
             <a:avLst/>
@@ -4407,7 +4407,7 @@
         <p:spPr>
           <a:xfrm>
             <a:off x="5613120" y="5239440"/>
-            <a:ext cx="161280" cy="1479240"/>
+            <a:ext cx="160200" cy="1478160"/>
           </a:xfrm>
           <a:prstGeom prst="rect">
             <a:avLst/>
@@ -4437,7 +4437,7 @@
         <p:spPr>
           <a:xfrm>
             <a:off x="5942520" y="5239440"/>
-            <a:ext cx="161640" cy="1479240"/>
+            <a:ext cx="160560" cy="1478160"/>
           </a:xfrm>
           <a:prstGeom prst="rect">
             <a:avLst/>
@@ -4467,7 +4467,7 @@
         <p:spPr>
           <a:xfrm>
             <a:off x="6271920" y="5239440"/>
-            <a:ext cx="161280" cy="1479240"/>
+            <a:ext cx="160200" cy="1478160"/>
           </a:xfrm>
           <a:prstGeom prst="rect">
             <a:avLst/>
@@ -4497,7 +4497,7 @@
         <p:spPr>
           <a:xfrm>
             <a:off x="6601320" y="5239440"/>
-            <a:ext cx="161640" cy="1479240"/>
+            <a:ext cx="160560" cy="1478160"/>
           </a:xfrm>
           <a:prstGeom prst="rect">
             <a:avLst/>
@@ -4526,8 +4526,8 @@
         </p:nvSpPr>
         <p:spPr>
           <a:xfrm rot="3468000">
-            <a:off x="6093720" y="5205600"/>
-            <a:ext cx="161280" cy="1479240"/>
+            <a:off x="6093720" y="5204880"/>
+            <a:ext cx="160200" cy="1478160"/>
           </a:xfrm>
           <a:prstGeom prst="rect">
             <a:avLst/>
@@ -4557,7 +4557,7 @@
         <p:spPr>
           <a:xfrm>
             <a:off x="5613120" y="5239440"/>
-            <a:ext cx="161280" cy="1479240"/>
+            <a:ext cx="160200" cy="1478160"/>
           </a:xfrm>
           <a:prstGeom prst="rect">
             <a:avLst/>
@@ -4587,7 +4587,7 @@
         <p:spPr>
           <a:xfrm>
             <a:off x="5942520" y="5239440"/>
-            <a:ext cx="161640" cy="1479240"/>
+            <a:ext cx="160560" cy="1478160"/>
           </a:xfrm>
           <a:prstGeom prst="rect">
             <a:avLst/>
@@ -4617,7 +4617,7 @@
         <p:spPr>
           <a:xfrm>
             <a:off x="6271920" y="5239440"/>
-            <a:ext cx="161280" cy="1479240"/>
+            <a:ext cx="160200" cy="1478160"/>
           </a:xfrm>
           <a:prstGeom prst="rect">
             <a:avLst/>
@@ -4647,7 +4647,7 @@
         <p:spPr>
           <a:xfrm>
             <a:off x="6601320" y="5239440"/>
-            <a:ext cx="161640" cy="1479240"/>
+            <a:ext cx="160560" cy="1478160"/>
           </a:xfrm>
           <a:prstGeom prst="rect">
             <a:avLst/>
@@ -4676,8 +4676,8 @@
         </p:nvSpPr>
         <p:spPr>
           <a:xfrm rot="3468000">
-            <a:off x="6093720" y="5205600"/>
-            <a:ext cx="161280" cy="1479240"/>
+            <a:off x="6093720" y="5204880"/>
+            <a:ext cx="160200" cy="1478160"/>
           </a:xfrm>
           <a:prstGeom prst="rect">
             <a:avLst/>
@@ -4707,7 +4707,7 @@
         <p:spPr>
           <a:xfrm>
             <a:off x="5613120" y="5239440"/>
-            <a:ext cx="161280" cy="1479240"/>
+            <a:ext cx="160200" cy="1478160"/>
           </a:xfrm>
           <a:prstGeom prst="rect">
             <a:avLst/>
@@ -4737,7 +4737,7 @@
         <p:spPr>
           <a:xfrm>
             <a:off x="7647480" y="5239440"/>
-            <a:ext cx="161280" cy="1479240"/>
+            <a:ext cx="160200" cy="1478160"/>
           </a:xfrm>
           <a:prstGeom prst="rect">
             <a:avLst/>

</xml_diff>

<commit_message>
add the tracking of the diet - nearly four weeks
</commit_message>
<xml_diff>
--- a/diet.pptx
+++ b/diet.pptx
@@ -1407,7 +1407,7 @@
         <p:spPr>
           <a:xfrm>
             <a:off x="1388520" y="792000"/>
-            <a:ext cx="159840" cy="1478160"/>
+            <a:ext cx="159120" cy="1477440"/>
           </a:xfrm>
           <a:prstGeom prst="rect">
             <a:avLst/>
@@ -1437,7 +1437,7 @@
         <p:spPr>
           <a:xfrm>
             <a:off x="1717560" y="792000"/>
-            <a:ext cx="160560" cy="1478160"/>
+            <a:ext cx="159840" cy="1477440"/>
           </a:xfrm>
           <a:prstGeom prst="rect">
             <a:avLst/>
@@ -1467,7 +1467,7 @@
         <p:spPr>
           <a:xfrm>
             <a:off x="2047320" y="792000"/>
-            <a:ext cx="159840" cy="1478160"/>
+            <a:ext cx="159120" cy="1477440"/>
           </a:xfrm>
           <a:prstGeom prst="rect">
             <a:avLst/>
@@ -1497,7 +1497,7 @@
         <p:spPr>
           <a:xfrm>
             <a:off x="2376360" y="792000"/>
-            <a:ext cx="160560" cy="1478160"/>
+            <a:ext cx="159840" cy="1477440"/>
           </a:xfrm>
           <a:prstGeom prst="rect">
             <a:avLst/>
@@ -1526,8 +1526,8 @@
         </p:nvSpPr>
         <p:spPr>
           <a:xfrm rot="3468000">
-            <a:off x="1869480" y="758520"/>
-            <a:ext cx="160200" cy="1478160"/>
+            <a:off x="1869840" y="758160"/>
+            <a:ext cx="159480" cy="1477440"/>
           </a:xfrm>
           <a:prstGeom prst="rect">
             <a:avLst/>
@@ -1557,7 +1557,7 @@
         <p:spPr>
           <a:xfrm>
             <a:off x="3472200" y="792000"/>
-            <a:ext cx="159840" cy="1478160"/>
+            <a:ext cx="159120" cy="1477440"/>
           </a:xfrm>
           <a:prstGeom prst="rect">
             <a:avLst/>
@@ -1587,7 +1587,7 @@
         <p:spPr>
           <a:xfrm>
             <a:off x="3801240" y="792000"/>
-            <a:ext cx="160560" cy="1478160"/>
+            <a:ext cx="159840" cy="1477440"/>
           </a:xfrm>
           <a:prstGeom prst="rect">
             <a:avLst/>
@@ -1617,7 +1617,7 @@
         <p:spPr>
           <a:xfrm>
             <a:off x="4131000" y="792000"/>
-            <a:ext cx="159840" cy="1478160"/>
+            <a:ext cx="159120" cy="1477440"/>
           </a:xfrm>
           <a:prstGeom prst="rect">
             <a:avLst/>
@@ -1647,7 +1647,7 @@
         <p:spPr>
           <a:xfrm>
             <a:off x="4460040" y="792000"/>
-            <a:ext cx="160560" cy="1478160"/>
+            <a:ext cx="159840" cy="1477440"/>
           </a:xfrm>
           <a:prstGeom prst="rect">
             <a:avLst/>
@@ -1676,8 +1676,8 @@
         </p:nvSpPr>
         <p:spPr>
           <a:xfrm rot="3468000">
-            <a:off x="3953160" y="758520"/>
-            <a:ext cx="160200" cy="1478160"/>
+            <a:off x="3953520" y="758160"/>
+            <a:ext cx="159480" cy="1477440"/>
           </a:xfrm>
           <a:prstGeom prst="rect">
             <a:avLst/>
@@ -1707,7 +1707,7 @@
         <p:spPr>
           <a:xfrm>
             <a:off x="1388520" y="792000"/>
-            <a:ext cx="159840" cy="1478160"/>
+            <a:ext cx="159120" cy="1477440"/>
           </a:xfrm>
           <a:prstGeom prst="rect">
             <a:avLst/>
@@ -1737,7 +1737,7 @@
         <p:spPr>
           <a:xfrm>
             <a:off x="1717560" y="792000"/>
-            <a:ext cx="160560" cy="1478160"/>
+            <a:ext cx="159840" cy="1477440"/>
           </a:xfrm>
           <a:prstGeom prst="rect">
             <a:avLst/>
@@ -1767,7 +1767,7 @@
         <p:spPr>
           <a:xfrm>
             <a:off x="2047320" y="792000"/>
-            <a:ext cx="159840" cy="1478160"/>
+            <a:ext cx="159120" cy="1477440"/>
           </a:xfrm>
           <a:prstGeom prst="rect">
             <a:avLst/>
@@ -1797,7 +1797,7 @@
         <p:spPr>
           <a:xfrm>
             <a:off x="2376360" y="792000"/>
-            <a:ext cx="160560" cy="1478160"/>
+            <a:ext cx="159840" cy="1477440"/>
           </a:xfrm>
           <a:prstGeom prst="rect">
             <a:avLst/>
@@ -1826,8 +1826,8 @@
         </p:nvSpPr>
         <p:spPr>
           <a:xfrm rot="3468000">
-            <a:off x="1869480" y="758520"/>
-            <a:ext cx="160200" cy="1478160"/>
+            <a:off x="1869840" y="758160"/>
+            <a:ext cx="159480" cy="1477440"/>
           </a:xfrm>
           <a:prstGeom prst="rect">
             <a:avLst/>
@@ -1857,7 +1857,7 @@
         <p:spPr>
           <a:xfrm>
             <a:off x="3472200" y="792000"/>
-            <a:ext cx="159840" cy="1478160"/>
+            <a:ext cx="159120" cy="1477440"/>
           </a:xfrm>
           <a:prstGeom prst="rect">
             <a:avLst/>
@@ -1887,7 +1887,7 @@
         <p:spPr>
           <a:xfrm>
             <a:off x="3801240" y="792000"/>
-            <a:ext cx="160560" cy="1478160"/>
+            <a:ext cx="159840" cy="1477440"/>
           </a:xfrm>
           <a:prstGeom prst="rect">
             <a:avLst/>
@@ -1917,7 +1917,7 @@
         <p:spPr>
           <a:xfrm>
             <a:off x="4131000" y="792000"/>
-            <a:ext cx="159840" cy="1478160"/>
+            <a:ext cx="159120" cy="1477440"/>
           </a:xfrm>
           <a:prstGeom prst="rect">
             <a:avLst/>
@@ -1947,7 +1947,7 @@
         <p:spPr>
           <a:xfrm>
             <a:off x="4460040" y="792000"/>
-            <a:ext cx="160560" cy="1478160"/>
+            <a:ext cx="159840" cy="1477440"/>
           </a:xfrm>
           <a:prstGeom prst="rect">
             <a:avLst/>
@@ -1976,8 +1976,8 @@
         </p:nvSpPr>
         <p:spPr>
           <a:xfrm rot="3468000">
-            <a:off x="3953160" y="758520"/>
-            <a:ext cx="160200" cy="1478160"/>
+            <a:off x="3953520" y="758160"/>
+            <a:ext cx="159480" cy="1477440"/>
           </a:xfrm>
           <a:prstGeom prst="rect">
             <a:avLst/>
@@ -2007,7 +2007,7 @@
         <p:spPr>
           <a:xfrm>
             <a:off x="5613120" y="792000"/>
-            <a:ext cx="160200" cy="1478160"/>
+            <a:ext cx="159480" cy="1477440"/>
           </a:xfrm>
           <a:prstGeom prst="rect">
             <a:avLst/>
@@ -2037,7 +2037,7 @@
         <p:spPr>
           <a:xfrm>
             <a:off x="5942520" y="792000"/>
-            <a:ext cx="160560" cy="1478160"/>
+            <a:ext cx="159840" cy="1477440"/>
           </a:xfrm>
           <a:prstGeom prst="rect">
             <a:avLst/>
@@ -2067,7 +2067,7 @@
         <p:spPr>
           <a:xfrm>
             <a:off x="6271920" y="792000"/>
-            <a:ext cx="160200" cy="1478160"/>
+            <a:ext cx="159480" cy="1477440"/>
           </a:xfrm>
           <a:prstGeom prst="rect">
             <a:avLst/>
@@ -2097,7 +2097,7 @@
         <p:spPr>
           <a:xfrm>
             <a:off x="6601320" y="792000"/>
-            <a:ext cx="160560" cy="1478160"/>
+            <a:ext cx="159840" cy="1477440"/>
           </a:xfrm>
           <a:prstGeom prst="rect">
             <a:avLst/>
@@ -2126,8 +2126,8 @@
         </p:nvSpPr>
         <p:spPr>
           <a:xfrm rot="3468000">
-            <a:off x="6094440" y="758520"/>
-            <a:ext cx="160200" cy="1478160"/>
+            <a:off x="6094800" y="758160"/>
+            <a:ext cx="159480" cy="1477440"/>
           </a:xfrm>
           <a:prstGeom prst="rect">
             <a:avLst/>
@@ -2157,7 +2157,7 @@
         <p:spPr>
           <a:xfrm>
             <a:off x="7696800" y="792000"/>
-            <a:ext cx="160200" cy="1478160"/>
+            <a:ext cx="159480" cy="1477440"/>
           </a:xfrm>
           <a:prstGeom prst="rect">
             <a:avLst/>
@@ -2187,7 +2187,7 @@
         <p:spPr>
           <a:xfrm>
             <a:off x="8026200" y="792000"/>
-            <a:ext cx="160560" cy="1478160"/>
+            <a:ext cx="159840" cy="1477440"/>
           </a:xfrm>
           <a:prstGeom prst="rect">
             <a:avLst/>
@@ -2217,7 +2217,7 @@
         <p:spPr>
           <a:xfrm>
             <a:off x="8355600" y="792000"/>
-            <a:ext cx="160200" cy="1478160"/>
+            <a:ext cx="159480" cy="1477440"/>
           </a:xfrm>
           <a:prstGeom prst="rect">
             <a:avLst/>
@@ -2247,7 +2247,7 @@
         <p:spPr>
           <a:xfrm>
             <a:off x="8685000" y="792000"/>
-            <a:ext cx="160560" cy="1478160"/>
+            <a:ext cx="159840" cy="1477440"/>
           </a:xfrm>
           <a:prstGeom prst="rect">
             <a:avLst/>
@@ -2276,8 +2276,8 @@
         </p:nvSpPr>
         <p:spPr>
           <a:xfrm rot="3468000">
-            <a:off x="8178120" y="758520"/>
-            <a:ext cx="160200" cy="1478160"/>
+            <a:off x="8178480" y="758160"/>
+            <a:ext cx="159480" cy="1477440"/>
           </a:xfrm>
           <a:prstGeom prst="rect">
             <a:avLst/>
@@ -2307,7 +2307,7 @@
         <p:spPr>
           <a:xfrm>
             <a:off x="5613120" y="792000"/>
-            <a:ext cx="160200" cy="1478160"/>
+            <a:ext cx="159480" cy="1477440"/>
           </a:xfrm>
           <a:prstGeom prst="rect">
             <a:avLst/>
@@ -2337,7 +2337,7 @@
         <p:spPr>
           <a:xfrm>
             <a:off x="5942520" y="792000"/>
-            <a:ext cx="160560" cy="1478160"/>
+            <a:ext cx="159840" cy="1477440"/>
           </a:xfrm>
           <a:prstGeom prst="rect">
             <a:avLst/>
@@ -2367,7 +2367,7 @@
         <p:spPr>
           <a:xfrm>
             <a:off x="6271920" y="792000"/>
-            <a:ext cx="160200" cy="1478160"/>
+            <a:ext cx="159480" cy="1477440"/>
           </a:xfrm>
           <a:prstGeom prst="rect">
             <a:avLst/>
@@ -2397,7 +2397,7 @@
         <p:spPr>
           <a:xfrm>
             <a:off x="6601320" y="792000"/>
-            <a:ext cx="160560" cy="1478160"/>
+            <a:ext cx="159840" cy="1477440"/>
           </a:xfrm>
           <a:prstGeom prst="rect">
             <a:avLst/>
@@ -2426,8 +2426,8 @@
         </p:nvSpPr>
         <p:spPr>
           <a:xfrm rot="3468000">
-            <a:off x="6094440" y="758520"/>
-            <a:ext cx="160200" cy="1478160"/>
+            <a:off x="6094800" y="758160"/>
+            <a:ext cx="159480" cy="1477440"/>
           </a:xfrm>
           <a:prstGeom prst="rect">
             <a:avLst/>
@@ -2457,7 +2457,7 @@
         <p:spPr>
           <a:xfrm>
             <a:off x="7696800" y="792000"/>
-            <a:ext cx="160200" cy="1478160"/>
+            <a:ext cx="159480" cy="1477440"/>
           </a:xfrm>
           <a:prstGeom prst="rect">
             <a:avLst/>
@@ -2487,7 +2487,7 @@
         <p:spPr>
           <a:xfrm>
             <a:off x="8026200" y="792000"/>
-            <a:ext cx="160560" cy="1478160"/>
+            <a:ext cx="159840" cy="1477440"/>
           </a:xfrm>
           <a:prstGeom prst="rect">
             <a:avLst/>
@@ -2517,7 +2517,7 @@
         <p:spPr>
           <a:xfrm>
             <a:off x="8355600" y="792000"/>
-            <a:ext cx="160200" cy="1478160"/>
+            <a:ext cx="159480" cy="1477440"/>
           </a:xfrm>
           <a:prstGeom prst="rect">
             <a:avLst/>
@@ -2547,7 +2547,7 @@
         <p:spPr>
           <a:xfrm>
             <a:off x="8685000" y="792000"/>
-            <a:ext cx="160560" cy="1478160"/>
+            <a:ext cx="159840" cy="1477440"/>
           </a:xfrm>
           <a:prstGeom prst="rect">
             <a:avLst/>
@@ -2576,8 +2576,8 @@
         </p:nvSpPr>
         <p:spPr>
           <a:xfrm rot="3468000">
-            <a:off x="8178120" y="758520"/>
-            <a:ext cx="160200" cy="1478160"/>
+            <a:off x="8178480" y="758160"/>
+            <a:ext cx="159480" cy="1477440"/>
           </a:xfrm>
           <a:prstGeom prst="rect">
             <a:avLst/>
@@ -2607,7 +2607,7 @@
         <p:spPr>
           <a:xfrm>
             <a:off x="1363320" y="2933280"/>
-            <a:ext cx="160560" cy="1478160"/>
+            <a:ext cx="159840" cy="1477440"/>
           </a:xfrm>
           <a:prstGeom prst="rect">
             <a:avLst/>
@@ -2637,7 +2637,7 @@
         <p:spPr>
           <a:xfrm>
             <a:off x="1693080" y="2933280"/>
-            <a:ext cx="160560" cy="1478160"/>
+            <a:ext cx="159840" cy="1477440"/>
           </a:xfrm>
           <a:prstGeom prst="rect">
             <a:avLst/>
@@ -2667,7 +2667,7 @@
         <p:spPr>
           <a:xfrm>
             <a:off x="2022480" y="2933280"/>
-            <a:ext cx="160200" cy="1478160"/>
+            <a:ext cx="159480" cy="1477440"/>
           </a:xfrm>
           <a:prstGeom prst="rect">
             <a:avLst/>
@@ -2697,7 +2697,7 @@
         <p:spPr>
           <a:xfrm>
             <a:off x="2351880" y="2933280"/>
-            <a:ext cx="160560" cy="1478160"/>
+            <a:ext cx="159840" cy="1477440"/>
           </a:xfrm>
           <a:prstGeom prst="rect">
             <a:avLst/>
@@ -2726,8 +2726,8 @@
         </p:nvSpPr>
         <p:spPr>
           <a:xfrm rot="3468000">
-            <a:off x="1845000" y="2899800"/>
-            <a:ext cx="160200" cy="1478160"/>
+            <a:off x="1845360" y="2899440"/>
+            <a:ext cx="159480" cy="1477440"/>
           </a:xfrm>
           <a:prstGeom prst="rect">
             <a:avLst/>
@@ -2757,7 +2757,7 @@
         <p:spPr>
           <a:xfrm>
             <a:off x="3447000" y="2933280"/>
-            <a:ext cx="160560" cy="1478160"/>
+            <a:ext cx="159840" cy="1477440"/>
           </a:xfrm>
           <a:prstGeom prst="rect">
             <a:avLst/>
@@ -2787,7 +2787,7 @@
         <p:spPr>
           <a:xfrm>
             <a:off x="3776760" y="2933280"/>
-            <a:ext cx="159840" cy="1478160"/>
+            <a:ext cx="159120" cy="1477440"/>
           </a:xfrm>
           <a:prstGeom prst="rect">
             <a:avLst/>
@@ -2817,7 +2817,7 @@
         <p:spPr>
           <a:xfrm>
             <a:off x="4105800" y="2933280"/>
-            <a:ext cx="160560" cy="1478160"/>
+            <a:ext cx="159840" cy="1477440"/>
           </a:xfrm>
           <a:prstGeom prst="rect">
             <a:avLst/>
@@ -2847,7 +2847,7 @@
         <p:spPr>
           <a:xfrm>
             <a:off x="4435560" y="2933280"/>
-            <a:ext cx="160560" cy="1478160"/>
+            <a:ext cx="159840" cy="1477440"/>
           </a:xfrm>
           <a:prstGeom prst="rect">
             <a:avLst/>
@@ -2876,8 +2876,8 @@
         </p:nvSpPr>
         <p:spPr>
           <a:xfrm rot="3468000">
-            <a:off x="3929400" y="2900880"/>
-            <a:ext cx="160200" cy="1477800"/>
+            <a:off x="3929400" y="2900520"/>
+            <a:ext cx="159480" cy="1477080"/>
           </a:xfrm>
           <a:prstGeom prst="rect">
             <a:avLst/>
@@ -2907,13 +2907,13 @@
         <p:spPr>
           <a:xfrm>
             <a:off x="1363320" y="2933280"/>
-            <a:ext cx="160560" cy="1478160"/>
-          </a:xfrm>
-          <a:prstGeom prst="rect">
-            <a:avLst/>
-          </a:prstGeom>
-          <a:solidFill>
-            <a:srgbClr val="ffffff"/>
+            <a:ext cx="159840" cy="1477440"/>
+          </a:xfrm>
+          <a:prstGeom prst="rect">
+            <a:avLst/>
+          </a:prstGeom>
+          <a:solidFill>
+            <a:srgbClr val="000000"/>
           </a:solidFill>
           <a:ln>
             <a:solidFill>
@@ -2937,13 +2937,13 @@
         <p:spPr>
           <a:xfrm>
             <a:off x="1693080" y="2933280"/>
-            <a:ext cx="160560" cy="1478160"/>
-          </a:xfrm>
-          <a:prstGeom prst="rect">
-            <a:avLst/>
-          </a:prstGeom>
-          <a:solidFill>
-            <a:srgbClr val="ffffff"/>
+            <a:ext cx="159840" cy="1477440"/>
+          </a:xfrm>
+          <a:prstGeom prst="rect">
+            <a:avLst/>
+          </a:prstGeom>
+          <a:solidFill>
+            <a:srgbClr val="000000"/>
           </a:solidFill>
           <a:ln>
             <a:solidFill>
@@ -2967,13 +2967,13 @@
         <p:spPr>
           <a:xfrm>
             <a:off x="2022480" y="2933280"/>
-            <a:ext cx="160200" cy="1478160"/>
-          </a:xfrm>
-          <a:prstGeom prst="rect">
-            <a:avLst/>
-          </a:prstGeom>
-          <a:solidFill>
-            <a:srgbClr val="ffffff"/>
+            <a:ext cx="159480" cy="1477440"/>
+          </a:xfrm>
+          <a:prstGeom prst="rect">
+            <a:avLst/>
+          </a:prstGeom>
+          <a:solidFill>
+            <a:srgbClr val="000000"/>
           </a:solidFill>
           <a:ln>
             <a:solidFill>
@@ -2997,13 +2997,13 @@
         <p:spPr>
           <a:xfrm>
             <a:off x="2351880" y="2933280"/>
-            <a:ext cx="160560" cy="1478160"/>
-          </a:xfrm>
-          <a:prstGeom prst="rect">
-            <a:avLst/>
-          </a:prstGeom>
-          <a:solidFill>
-            <a:srgbClr val="ffffff"/>
+            <a:ext cx="159840" cy="1477440"/>
+          </a:xfrm>
+          <a:prstGeom prst="rect">
+            <a:avLst/>
+          </a:prstGeom>
+          <a:solidFill>
+            <a:srgbClr val="000000"/>
           </a:solidFill>
           <a:ln>
             <a:solidFill>
@@ -3026,14 +3026,14 @@
         </p:nvSpPr>
         <p:spPr>
           <a:xfrm rot="3468000">
-            <a:off x="1845000" y="2899800"/>
-            <a:ext cx="160200" cy="1478160"/>
-          </a:xfrm>
-          <a:prstGeom prst="rect">
-            <a:avLst/>
-          </a:prstGeom>
-          <a:solidFill>
-            <a:srgbClr val="ffffff"/>
+            <a:off x="1845360" y="2899440"/>
+            <a:ext cx="159480" cy="1477440"/>
+          </a:xfrm>
+          <a:prstGeom prst="rect">
+            <a:avLst/>
+          </a:prstGeom>
+          <a:solidFill>
+            <a:srgbClr val="000000"/>
           </a:solidFill>
           <a:ln>
             <a:solidFill>
@@ -3057,7 +3057,7 @@
         <p:spPr>
           <a:xfrm>
             <a:off x="3447000" y="2933280"/>
-            <a:ext cx="160560" cy="1478160"/>
+            <a:ext cx="159840" cy="1477440"/>
           </a:xfrm>
           <a:prstGeom prst="rect">
             <a:avLst/>
@@ -3087,7 +3087,7 @@
         <p:spPr>
           <a:xfrm>
             <a:off x="3776760" y="2933280"/>
-            <a:ext cx="159840" cy="1478160"/>
+            <a:ext cx="159120" cy="1477440"/>
           </a:xfrm>
           <a:prstGeom prst="rect">
             <a:avLst/>
@@ -3117,13 +3117,13 @@
         <p:spPr>
           <a:xfrm>
             <a:off x="4105800" y="2933280"/>
-            <a:ext cx="160560" cy="1478160"/>
-          </a:xfrm>
-          <a:prstGeom prst="rect">
-            <a:avLst/>
-          </a:prstGeom>
-          <a:solidFill>
-            <a:srgbClr val="ffffff"/>
+            <a:ext cx="159840" cy="1477440"/>
+          </a:xfrm>
+          <a:prstGeom prst="rect">
+            <a:avLst/>
+          </a:prstGeom>
+          <a:solidFill>
+            <a:srgbClr val="ef413d"/>
           </a:solidFill>
           <a:ln>
             <a:solidFill>
@@ -3147,7 +3147,7 @@
         <p:spPr>
           <a:xfrm>
             <a:off x="4435560" y="2933280"/>
-            <a:ext cx="160560" cy="1478160"/>
+            <a:ext cx="159840" cy="1477440"/>
           </a:xfrm>
           <a:prstGeom prst="rect">
             <a:avLst/>
@@ -3176,8 +3176,8 @@
         </p:nvSpPr>
         <p:spPr>
           <a:xfrm rot="3468000">
-            <a:off x="3929400" y="2900880"/>
-            <a:ext cx="160200" cy="1477800"/>
+            <a:off x="3929400" y="2900520"/>
+            <a:ext cx="159480" cy="1477080"/>
           </a:xfrm>
           <a:prstGeom prst="rect">
             <a:avLst/>
@@ -3207,7 +3207,7 @@
         <p:spPr>
           <a:xfrm>
             <a:off x="5613120" y="2933280"/>
-            <a:ext cx="160200" cy="1478160"/>
+            <a:ext cx="159480" cy="1477440"/>
           </a:xfrm>
           <a:prstGeom prst="rect">
             <a:avLst/>
@@ -3237,7 +3237,7 @@
         <p:spPr>
           <a:xfrm>
             <a:off x="5942520" y="2933280"/>
-            <a:ext cx="160560" cy="1478160"/>
+            <a:ext cx="159840" cy="1477440"/>
           </a:xfrm>
           <a:prstGeom prst="rect">
             <a:avLst/>
@@ -3267,7 +3267,7 @@
         <p:spPr>
           <a:xfrm>
             <a:off x="6271920" y="2933280"/>
-            <a:ext cx="160200" cy="1478160"/>
+            <a:ext cx="159480" cy="1477440"/>
           </a:xfrm>
           <a:prstGeom prst="rect">
             <a:avLst/>
@@ -3297,7 +3297,7 @@
         <p:spPr>
           <a:xfrm>
             <a:off x="6601320" y="2933280"/>
-            <a:ext cx="160560" cy="1478160"/>
+            <a:ext cx="159840" cy="1477440"/>
           </a:xfrm>
           <a:prstGeom prst="rect">
             <a:avLst/>
@@ -3326,8 +3326,8 @@
         </p:nvSpPr>
         <p:spPr>
           <a:xfrm rot="3468000">
-            <a:off x="6094440" y="2899800"/>
-            <a:ext cx="160200" cy="1478160"/>
+            <a:off x="6094800" y="2899440"/>
+            <a:ext cx="159480" cy="1477440"/>
           </a:xfrm>
           <a:prstGeom prst="rect">
             <a:avLst/>
@@ -3357,7 +3357,7 @@
         <p:spPr>
           <a:xfrm>
             <a:off x="7696800" y="2933280"/>
-            <a:ext cx="160200" cy="1478160"/>
+            <a:ext cx="159480" cy="1477440"/>
           </a:xfrm>
           <a:prstGeom prst="rect">
             <a:avLst/>
@@ -3387,7 +3387,7 @@
         <p:spPr>
           <a:xfrm>
             <a:off x="8026200" y="2933280"/>
-            <a:ext cx="160560" cy="1478160"/>
+            <a:ext cx="159840" cy="1477440"/>
           </a:xfrm>
           <a:prstGeom prst="rect">
             <a:avLst/>
@@ -3417,7 +3417,7 @@
         <p:spPr>
           <a:xfrm>
             <a:off x="8355600" y="2933280"/>
-            <a:ext cx="160200" cy="1478160"/>
+            <a:ext cx="159480" cy="1477440"/>
           </a:xfrm>
           <a:prstGeom prst="rect">
             <a:avLst/>
@@ -3447,7 +3447,7 @@
         <p:spPr>
           <a:xfrm>
             <a:off x="8685000" y="2933280"/>
-            <a:ext cx="160560" cy="1478160"/>
+            <a:ext cx="159840" cy="1477440"/>
           </a:xfrm>
           <a:prstGeom prst="rect">
             <a:avLst/>
@@ -3476,8 +3476,8 @@
         </p:nvSpPr>
         <p:spPr>
           <a:xfrm rot="3468000">
-            <a:off x="8178120" y="2899800"/>
-            <a:ext cx="160200" cy="1478160"/>
+            <a:off x="8178480" y="2899440"/>
+            <a:ext cx="159480" cy="1477440"/>
           </a:xfrm>
           <a:prstGeom prst="rect">
             <a:avLst/>
@@ -3507,7 +3507,7 @@
         <p:spPr>
           <a:xfrm>
             <a:off x="5613120" y="2933280"/>
-            <a:ext cx="160200" cy="1478160"/>
+            <a:ext cx="159480" cy="1477440"/>
           </a:xfrm>
           <a:prstGeom prst="rect">
             <a:avLst/>
@@ -3537,7 +3537,7 @@
         <p:spPr>
           <a:xfrm>
             <a:off x="5942520" y="2933280"/>
-            <a:ext cx="160560" cy="1478160"/>
+            <a:ext cx="159840" cy="1477440"/>
           </a:xfrm>
           <a:prstGeom prst="rect">
             <a:avLst/>
@@ -3567,7 +3567,7 @@
         <p:spPr>
           <a:xfrm>
             <a:off x="6271920" y="2933280"/>
-            <a:ext cx="160200" cy="1478160"/>
+            <a:ext cx="159480" cy="1477440"/>
           </a:xfrm>
           <a:prstGeom prst="rect">
             <a:avLst/>
@@ -3597,7 +3597,7 @@
         <p:spPr>
           <a:xfrm>
             <a:off x="6601320" y="2933280"/>
-            <a:ext cx="160560" cy="1478160"/>
+            <a:ext cx="159840" cy="1477440"/>
           </a:xfrm>
           <a:prstGeom prst="rect">
             <a:avLst/>
@@ -3626,14 +3626,14 @@
         </p:nvSpPr>
         <p:spPr>
           <a:xfrm rot="3468000">
-            <a:off x="6094440" y="2899800"/>
-            <a:ext cx="160200" cy="1478160"/>
-          </a:xfrm>
-          <a:prstGeom prst="rect">
-            <a:avLst/>
-          </a:prstGeom>
-          <a:solidFill>
-            <a:srgbClr val="ffffff"/>
+            <a:off x="6094800" y="2899440"/>
+            <a:ext cx="159480" cy="1477440"/>
+          </a:xfrm>
+          <a:prstGeom prst="rect">
+            <a:avLst/>
+          </a:prstGeom>
+          <a:solidFill>
+            <a:srgbClr val="ef413d"/>
           </a:solidFill>
           <a:ln>
             <a:solidFill>
@@ -3657,7 +3657,7 @@
         <p:spPr>
           <a:xfrm>
             <a:off x="7696800" y="2933280"/>
-            <a:ext cx="160200" cy="1478160"/>
+            <a:ext cx="159480" cy="1477440"/>
           </a:xfrm>
           <a:prstGeom prst="rect">
             <a:avLst/>
@@ -3687,7 +3687,7 @@
         <p:spPr>
           <a:xfrm>
             <a:off x="8026200" y="2933280"/>
-            <a:ext cx="160560" cy="1478160"/>
+            <a:ext cx="159840" cy="1477440"/>
           </a:xfrm>
           <a:prstGeom prst="rect">
             <a:avLst/>
@@ -3717,7 +3717,7 @@
         <p:spPr>
           <a:xfrm>
             <a:off x="8355600" y="2933280"/>
-            <a:ext cx="160200" cy="1478160"/>
+            <a:ext cx="159480" cy="1477440"/>
           </a:xfrm>
           <a:prstGeom prst="rect">
             <a:avLst/>
@@ -3747,7 +3747,7 @@
         <p:spPr>
           <a:xfrm>
             <a:off x="8685000" y="2933280"/>
-            <a:ext cx="160560" cy="1478160"/>
+            <a:ext cx="159840" cy="1477440"/>
           </a:xfrm>
           <a:prstGeom prst="rect">
             <a:avLst/>
@@ -3776,8 +3776,8 @@
         </p:nvSpPr>
         <p:spPr>
           <a:xfrm rot="3468000">
-            <a:off x="8178120" y="2899800"/>
-            <a:ext cx="160200" cy="1478160"/>
+            <a:off x="8178480" y="2899440"/>
+            <a:ext cx="159480" cy="1477440"/>
           </a:xfrm>
           <a:prstGeom prst="rect">
             <a:avLst/>
@@ -3807,7 +3807,7 @@
         <p:spPr>
           <a:xfrm>
             <a:off x="1330920" y="5239440"/>
-            <a:ext cx="159840" cy="1478160"/>
+            <a:ext cx="159120" cy="1477440"/>
           </a:xfrm>
           <a:prstGeom prst="rect">
             <a:avLst/>
@@ -3837,7 +3837,7 @@
         <p:spPr>
           <a:xfrm>
             <a:off x="1659960" y="5239440"/>
-            <a:ext cx="160560" cy="1478160"/>
+            <a:ext cx="159840" cy="1477440"/>
           </a:xfrm>
           <a:prstGeom prst="rect">
             <a:avLst/>
@@ -3867,7 +3867,7 @@
         <p:spPr>
           <a:xfrm>
             <a:off x="1989720" y="5239440"/>
-            <a:ext cx="160200" cy="1478160"/>
+            <a:ext cx="159480" cy="1477440"/>
           </a:xfrm>
           <a:prstGeom prst="rect">
             <a:avLst/>
@@ -3897,7 +3897,7 @@
         <p:spPr>
           <a:xfrm>
             <a:off x="2318760" y="5239440"/>
-            <a:ext cx="160560" cy="1478160"/>
+            <a:ext cx="159840" cy="1477440"/>
           </a:xfrm>
           <a:prstGeom prst="rect">
             <a:avLst/>
@@ -3926,8 +3926,8 @@
         </p:nvSpPr>
         <p:spPr>
           <a:xfrm rot="3468000">
-            <a:off x="1811160" y="5204880"/>
-            <a:ext cx="160200" cy="1478160"/>
+            <a:off x="1811520" y="5204520"/>
+            <a:ext cx="159480" cy="1477440"/>
           </a:xfrm>
           <a:prstGeom prst="rect">
             <a:avLst/>
@@ -3957,7 +3957,7 @@
         <p:spPr>
           <a:xfrm>
             <a:off x="3413880" y="5239440"/>
-            <a:ext cx="160560" cy="1478160"/>
+            <a:ext cx="159840" cy="1477440"/>
           </a:xfrm>
           <a:prstGeom prst="rect">
             <a:avLst/>
@@ -3987,7 +3987,7 @@
         <p:spPr>
           <a:xfrm>
             <a:off x="3743640" y="5239440"/>
-            <a:ext cx="160200" cy="1478160"/>
+            <a:ext cx="159480" cy="1477440"/>
           </a:xfrm>
           <a:prstGeom prst="rect">
             <a:avLst/>
@@ -4017,7 +4017,7 @@
         <p:spPr>
           <a:xfrm>
             <a:off x="4073400" y="5239440"/>
-            <a:ext cx="159840" cy="1478160"/>
+            <a:ext cx="159120" cy="1477440"/>
           </a:xfrm>
           <a:prstGeom prst="rect">
             <a:avLst/>
@@ -4047,7 +4047,7 @@
         <p:spPr>
           <a:xfrm>
             <a:off x="4402440" y="5239440"/>
-            <a:ext cx="160560" cy="1478160"/>
+            <a:ext cx="159840" cy="1477440"/>
           </a:xfrm>
           <a:prstGeom prst="rect">
             <a:avLst/>
@@ -4076,8 +4076,8 @@
         </p:nvSpPr>
         <p:spPr>
           <a:xfrm rot="3468000">
-            <a:off x="3894840" y="5204880"/>
-            <a:ext cx="160200" cy="1478160"/>
+            <a:off x="3895200" y="5204520"/>
+            <a:ext cx="159480" cy="1477440"/>
           </a:xfrm>
           <a:prstGeom prst="rect">
             <a:avLst/>
@@ -4107,7 +4107,7 @@
         <p:spPr>
           <a:xfrm>
             <a:off x="1330920" y="5239440"/>
-            <a:ext cx="159840" cy="1478160"/>
+            <a:ext cx="159120" cy="1477440"/>
           </a:xfrm>
           <a:prstGeom prst="rect">
             <a:avLst/>
@@ -4137,13 +4137,13 @@
         <p:spPr>
           <a:xfrm>
             <a:off x="1659960" y="5239440"/>
-            <a:ext cx="160560" cy="1478160"/>
-          </a:xfrm>
-          <a:prstGeom prst="rect">
-            <a:avLst/>
-          </a:prstGeom>
-          <a:solidFill>
-            <a:srgbClr val="ffffff"/>
+            <a:ext cx="159840" cy="1477440"/>
+          </a:xfrm>
+          <a:prstGeom prst="rect">
+            <a:avLst/>
+          </a:prstGeom>
+          <a:solidFill>
+            <a:srgbClr val="ef413d"/>
           </a:solidFill>
           <a:ln>
             <a:solidFill>
@@ -4167,7 +4167,7 @@
         <p:spPr>
           <a:xfrm>
             <a:off x="1989720" y="5239440"/>
-            <a:ext cx="160200" cy="1478160"/>
+            <a:ext cx="159480" cy="1477440"/>
           </a:xfrm>
           <a:prstGeom prst="rect">
             <a:avLst/>
@@ -4197,7 +4197,7 @@
         <p:spPr>
           <a:xfrm>
             <a:off x="2318760" y="5239440"/>
-            <a:ext cx="160560" cy="1478160"/>
+            <a:ext cx="159840" cy="1477440"/>
           </a:xfrm>
           <a:prstGeom prst="rect">
             <a:avLst/>
@@ -4226,8 +4226,8 @@
         </p:nvSpPr>
         <p:spPr>
           <a:xfrm rot="3468000">
-            <a:off x="1811160" y="5204880"/>
-            <a:ext cx="160200" cy="1478160"/>
+            <a:off x="1811520" y="5204520"/>
+            <a:ext cx="159480" cy="1477440"/>
           </a:xfrm>
           <a:prstGeom prst="rect">
             <a:avLst/>
@@ -4257,7 +4257,7 @@
         <p:spPr>
           <a:xfrm>
             <a:off x="3413880" y="5239440"/>
-            <a:ext cx="160560" cy="1478160"/>
+            <a:ext cx="159840" cy="1477440"/>
           </a:xfrm>
           <a:prstGeom prst="rect">
             <a:avLst/>
@@ -4287,7 +4287,7 @@
         <p:spPr>
           <a:xfrm>
             <a:off x="3743640" y="5239440"/>
-            <a:ext cx="160200" cy="1478160"/>
+            <a:ext cx="159480" cy="1477440"/>
           </a:xfrm>
           <a:prstGeom prst="rect">
             <a:avLst/>
@@ -4317,7 +4317,7 @@
         <p:spPr>
           <a:xfrm>
             <a:off x="4073400" y="5239440"/>
-            <a:ext cx="159840" cy="1478160"/>
+            <a:ext cx="159120" cy="1477440"/>
           </a:xfrm>
           <a:prstGeom prst="rect">
             <a:avLst/>
@@ -4347,13 +4347,13 @@
         <p:spPr>
           <a:xfrm>
             <a:off x="4402440" y="5239440"/>
-            <a:ext cx="160560" cy="1478160"/>
-          </a:xfrm>
-          <a:prstGeom prst="rect">
-            <a:avLst/>
-          </a:prstGeom>
-          <a:solidFill>
-            <a:srgbClr val="ffffff"/>
+            <a:ext cx="159840" cy="1477440"/>
+          </a:xfrm>
+          <a:prstGeom prst="rect">
+            <a:avLst/>
+          </a:prstGeom>
+          <a:solidFill>
+            <a:srgbClr val="ef413d"/>
           </a:solidFill>
           <a:ln>
             <a:solidFill>
@@ -4376,8 +4376,8 @@
         </p:nvSpPr>
         <p:spPr>
           <a:xfrm rot="3468000">
-            <a:off x="3894840" y="5204880"/>
-            <a:ext cx="160200" cy="1478160"/>
+            <a:off x="3895200" y="5204520"/>
+            <a:ext cx="159480" cy="1477440"/>
           </a:xfrm>
           <a:prstGeom prst="rect">
             <a:avLst/>
@@ -4407,7 +4407,7 @@
         <p:spPr>
           <a:xfrm>
             <a:off x="5613120" y="5239440"/>
-            <a:ext cx="160200" cy="1478160"/>
+            <a:ext cx="159480" cy="1477440"/>
           </a:xfrm>
           <a:prstGeom prst="rect">
             <a:avLst/>
@@ -4437,7 +4437,7 @@
         <p:spPr>
           <a:xfrm>
             <a:off x="5942520" y="5239440"/>
-            <a:ext cx="160560" cy="1478160"/>
+            <a:ext cx="159840" cy="1477440"/>
           </a:xfrm>
           <a:prstGeom prst="rect">
             <a:avLst/>
@@ -4467,7 +4467,7 @@
         <p:spPr>
           <a:xfrm>
             <a:off x="6271920" y="5239440"/>
-            <a:ext cx="160200" cy="1478160"/>
+            <a:ext cx="159480" cy="1477440"/>
           </a:xfrm>
           <a:prstGeom prst="rect">
             <a:avLst/>
@@ -4497,7 +4497,7 @@
         <p:spPr>
           <a:xfrm>
             <a:off x="6601320" y="5239440"/>
-            <a:ext cx="160560" cy="1478160"/>
+            <a:ext cx="159840" cy="1477440"/>
           </a:xfrm>
           <a:prstGeom prst="rect">
             <a:avLst/>
@@ -4526,8 +4526,8 @@
         </p:nvSpPr>
         <p:spPr>
           <a:xfrm rot="3468000">
-            <a:off x="6093720" y="5204880"/>
-            <a:ext cx="160200" cy="1478160"/>
+            <a:off x="6094080" y="5204520"/>
+            <a:ext cx="159480" cy="1477440"/>
           </a:xfrm>
           <a:prstGeom prst="rect">
             <a:avLst/>
@@ -4557,7 +4557,7 @@
         <p:spPr>
           <a:xfrm>
             <a:off x="5613120" y="5239440"/>
-            <a:ext cx="160200" cy="1478160"/>
+            <a:ext cx="159480" cy="1477440"/>
           </a:xfrm>
           <a:prstGeom prst="rect">
             <a:avLst/>
@@ -4587,7 +4587,7 @@
         <p:spPr>
           <a:xfrm>
             <a:off x="5942520" y="5239440"/>
-            <a:ext cx="160560" cy="1478160"/>
+            <a:ext cx="159840" cy="1477440"/>
           </a:xfrm>
           <a:prstGeom prst="rect">
             <a:avLst/>
@@ -4617,7 +4617,7 @@
         <p:spPr>
           <a:xfrm>
             <a:off x="6271920" y="5239440"/>
-            <a:ext cx="160200" cy="1478160"/>
+            <a:ext cx="159480" cy="1477440"/>
           </a:xfrm>
           <a:prstGeom prst="rect">
             <a:avLst/>
@@ -4647,7 +4647,7 @@
         <p:spPr>
           <a:xfrm>
             <a:off x="6601320" y="5239440"/>
-            <a:ext cx="160560" cy="1478160"/>
+            <a:ext cx="159840" cy="1477440"/>
           </a:xfrm>
           <a:prstGeom prst="rect">
             <a:avLst/>
@@ -4676,8 +4676,8 @@
         </p:nvSpPr>
         <p:spPr>
           <a:xfrm rot="3468000">
-            <a:off x="6093720" y="5204880"/>
-            <a:ext cx="160200" cy="1478160"/>
+            <a:off x="6094080" y="5204520"/>
+            <a:ext cx="159480" cy="1477440"/>
           </a:xfrm>
           <a:prstGeom prst="rect">
             <a:avLst/>
@@ -4707,7 +4707,7 @@
         <p:spPr>
           <a:xfrm>
             <a:off x="5613120" y="5239440"/>
-            <a:ext cx="160200" cy="1478160"/>
+            <a:ext cx="159480" cy="1477440"/>
           </a:xfrm>
           <a:prstGeom prst="rect">
             <a:avLst/>
@@ -4737,7 +4737,7 @@
         <p:spPr>
           <a:xfrm>
             <a:off x="7647480" y="5239440"/>
-            <a:ext cx="160200" cy="1478160"/>
+            <a:ext cx="159480" cy="1477440"/>
           </a:xfrm>
           <a:prstGeom prst="rect">
             <a:avLst/>

</xml_diff>